<commit_message>
JPA Repo & setting file created
</commit_message>
<xml_diff>
--- a/Spring-Springboot/스프링 프레임워크 학습자료.pptx
+++ b/Spring-Springboot/스프링 프레임워크 학습자료.pptx
@@ -8,6 +8,7 @@
     <p:sldId id="256" r:id="rId2"/>
     <p:sldId id="257" r:id="rId3"/>
     <p:sldId id="258" r:id="rId4"/>
+    <p:sldId id="259" r:id="rId5"/>
   </p:sldIdLst>
   <p:sldSz cx="12192000" cy="6858000"/>
   <p:notesSz cx="6858000" cy="9144000"/>
@@ -245,7 +246,7 @@
           <a:p>
             <a:fld id="{939B0B54-38C2-4878-9BDB-D65EE6D99877}" type="datetimeFigureOut">
               <a:rPr lang="ko-KR" altLang="en-US" smtClean="0"/>
-              <a:t>2020-01-24</a:t>
+              <a:t>2020-01-27</a:t>
             </a:fld>
             <a:endParaRPr lang="ko-KR" altLang="en-US"/>
           </a:p>
@@ -415,7 +416,7 @@
           <a:p>
             <a:fld id="{939B0B54-38C2-4878-9BDB-D65EE6D99877}" type="datetimeFigureOut">
               <a:rPr lang="ko-KR" altLang="en-US" smtClean="0"/>
-              <a:t>2020-01-24</a:t>
+              <a:t>2020-01-27</a:t>
             </a:fld>
             <a:endParaRPr lang="ko-KR" altLang="en-US"/>
           </a:p>
@@ -595,7 +596,7 @@
           <a:p>
             <a:fld id="{939B0B54-38C2-4878-9BDB-D65EE6D99877}" type="datetimeFigureOut">
               <a:rPr lang="ko-KR" altLang="en-US" smtClean="0"/>
-              <a:t>2020-01-24</a:t>
+              <a:t>2020-01-27</a:t>
             </a:fld>
             <a:endParaRPr lang="ko-KR" altLang="en-US"/>
           </a:p>
@@ -765,7 +766,7 @@
           <a:p>
             <a:fld id="{939B0B54-38C2-4878-9BDB-D65EE6D99877}" type="datetimeFigureOut">
               <a:rPr lang="ko-KR" altLang="en-US" smtClean="0"/>
-              <a:t>2020-01-24</a:t>
+              <a:t>2020-01-27</a:t>
             </a:fld>
             <a:endParaRPr lang="ko-KR" altLang="en-US"/>
           </a:p>
@@ -1011,7 +1012,7 @@
           <a:p>
             <a:fld id="{939B0B54-38C2-4878-9BDB-D65EE6D99877}" type="datetimeFigureOut">
               <a:rPr lang="ko-KR" altLang="en-US" smtClean="0"/>
-              <a:t>2020-01-24</a:t>
+              <a:t>2020-01-27</a:t>
             </a:fld>
             <a:endParaRPr lang="ko-KR" altLang="en-US"/>
           </a:p>
@@ -1243,7 +1244,7 @@
           <a:p>
             <a:fld id="{939B0B54-38C2-4878-9BDB-D65EE6D99877}" type="datetimeFigureOut">
               <a:rPr lang="ko-KR" altLang="en-US" smtClean="0"/>
-              <a:t>2020-01-24</a:t>
+              <a:t>2020-01-27</a:t>
             </a:fld>
             <a:endParaRPr lang="ko-KR" altLang="en-US"/>
           </a:p>
@@ -1610,7 +1611,7 @@
           <a:p>
             <a:fld id="{939B0B54-38C2-4878-9BDB-D65EE6D99877}" type="datetimeFigureOut">
               <a:rPr lang="ko-KR" altLang="en-US" smtClean="0"/>
-              <a:t>2020-01-24</a:t>
+              <a:t>2020-01-27</a:t>
             </a:fld>
             <a:endParaRPr lang="ko-KR" altLang="en-US"/>
           </a:p>
@@ -1728,7 +1729,7 @@
           <a:p>
             <a:fld id="{939B0B54-38C2-4878-9BDB-D65EE6D99877}" type="datetimeFigureOut">
               <a:rPr lang="ko-KR" altLang="en-US" smtClean="0"/>
-              <a:t>2020-01-24</a:t>
+              <a:t>2020-01-27</a:t>
             </a:fld>
             <a:endParaRPr lang="ko-KR" altLang="en-US"/>
           </a:p>
@@ -1823,7 +1824,7 @@
           <a:p>
             <a:fld id="{939B0B54-38C2-4878-9BDB-D65EE6D99877}" type="datetimeFigureOut">
               <a:rPr lang="ko-KR" altLang="en-US" smtClean="0"/>
-              <a:t>2020-01-24</a:t>
+              <a:t>2020-01-27</a:t>
             </a:fld>
             <a:endParaRPr lang="ko-KR" altLang="en-US"/>
           </a:p>
@@ -2100,7 +2101,7 @@
           <a:p>
             <a:fld id="{939B0B54-38C2-4878-9BDB-D65EE6D99877}" type="datetimeFigureOut">
               <a:rPr lang="ko-KR" altLang="en-US" smtClean="0"/>
-              <a:t>2020-01-24</a:t>
+              <a:t>2020-01-27</a:t>
             </a:fld>
             <a:endParaRPr lang="ko-KR" altLang="en-US"/>
           </a:p>
@@ -2353,7 +2354,7 @@
           <a:p>
             <a:fld id="{939B0B54-38C2-4878-9BDB-D65EE6D99877}" type="datetimeFigureOut">
               <a:rPr lang="ko-KR" altLang="en-US" smtClean="0"/>
-              <a:t>2020-01-24</a:t>
+              <a:t>2020-01-27</a:t>
             </a:fld>
             <a:endParaRPr lang="ko-KR" altLang="en-US"/>
           </a:p>
@@ -2566,7 +2567,7 @@
           <a:p>
             <a:fld id="{939B0B54-38C2-4878-9BDB-D65EE6D99877}" type="datetimeFigureOut">
               <a:rPr lang="ko-KR" altLang="en-US" smtClean="0"/>
-              <a:t>2020-01-24</a:t>
+              <a:t>2020-01-27</a:t>
             </a:fld>
             <a:endParaRPr lang="ko-KR" altLang="en-US"/>
           </a:p>
@@ -4015,6 +4016,36 @@
 </p:sld>
 </file>
 
+<file path=ppt/slides/slide4.xml><?xml version="1.0" encoding="utf-8"?>
+<p:sld xmlns:a="http://schemas.openxmlformats.org/drawingml/2006/main" xmlns:r="http://schemas.openxmlformats.org/officeDocument/2006/relationships" xmlns:p="http://schemas.openxmlformats.org/presentationml/2006/main">
+  <p:cSld>
+    <p:spTree>
+      <p:nvGrpSpPr>
+        <p:cNvPr id="1" name=""/>
+        <p:cNvGrpSpPr/>
+        <p:nvPr/>
+      </p:nvGrpSpPr>
+      <p:grpSpPr>
+        <a:xfrm>
+          <a:off x="0" y="0"/>
+          <a:ext cx="0" cy="0"/>
+          <a:chOff x="0" y="0"/>
+          <a:chExt cx="0" cy="0"/>
+        </a:xfrm>
+      </p:grpSpPr>
+    </p:spTree>
+    <p:extLst>
+      <p:ext uri="{BB962C8B-B14F-4D97-AF65-F5344CB8AC3E}">
+        <p14:creationId xmlns:p14="http://schemas.microsoft.com/office/powerpoint/2010/main" val="2207320745"/>
+      </p:ext>
+    </p:extLst>
+  </p:cSld>
+  <p:clrMapOvr>
+    <a:masterClrMapping/>
+  </p:clrMapOvr>
+</p:sld>
+</file>
+
 <file path=ppt/theme/theme1.xml><?xml version="1.0" encoding="utf-8"?>
 <a:theme xmlns:a="http://schemas.openxmlformats.org/drawingml/2006/main" name="Office 테마">
   <a:themeElements>

</xml_diff>

<commit_message>
jpa test user created
</commit_message>
<xml_diff>
--- a/Spring-Springboot/스프링 프레임워크 학습자료.pptx
+++ b/Spring-Springboot/스프링 프레임워크 학습자료.pptx
@@ -14,6 +14,7 @@
     <p:sldId id="262" r:id="rId8"/>
     <p:sldId id="264" r:id="rId9"/>
     <p:sldId id="263" r:id="rId10"/>
+    <p:sldId id="265" r:id="rId11"/>
   </p:sldIdLst>
   <p:sldSz cx="12192000" cy="6858000"/>
   <p:notesSz cx="6858000" cy="9144000"/>
@@ -3060,6 +3061,200 @@
 </p:sld>
 </file>
 
+<file path=ppt/slides/slide10.xml><?xml version="1.0" encoding="utf-8"?>
+<p:sld xmlns:a="http://schemas.openxmlformats.org/drawingml/2006/main" xmlns:r="http://schemas.openxmlformats.org/officeDocument/2006/relationships" xmlns:p="http://schemas.openxmlformats.org/presentationml/2006/main">
+  <p:cSld>
+    <p:spTree>
+      <p:nvGrpSpPr>
+        <p:cNvPr id="1" name=""/>
+        <p:cNvGrpSpPr/>
+        <p:nvPr/>
+      </p:nvGrpSpPr>
+      <p:grpSpPr>
+        <a:xfrm>
+          <a:off x="0" y="0"/>
+          <a:ext cx="0" cy="0"/>
+          <a:chOff x="0" y="0"/>
+          <a:chExt cx="0" cy="0"/>
+        </a:xfrm>
+      </p:grpSpPr>
+      <p:pic>
+        <p:nvPicPr>
+          <p:cNvPr id="6" name="그림 5"/>
+          <p:cNvPicPr>
+            <a:picLocks noChangeAspect="1"/>
+          </p:cNvPicPr>
+          <p:nvPr/>
+        </p:nvPicPr>
+        <p:blipFill>
+          <a:blip r:embed="rId2"/>
+          <a:stretch>
+            <a:fillRect/>
+          </a:stretch>
+        </p:blipFill>
+        <p:spPr>
+          <a:xfrm>
+            <a:off x="153099" y="138863"/>
+            <a:ext cx="3062757" cy="2119428"/>
+          </a:xfrm>
+          <a:prstGeom prst="rect">
+            <a:avLst/>
+          </a:prstGeom>
+        </p:spPr>
+      </p:pic>
+      <p:pic>
+        <p:nvPicPr>
+          <p:cNvPr id="7" name="그림 6"/>
+          <p:cNvPicPr>
+            <a:picLocks noChangeAspect="1"/>
+          </p:cNvPicPr>
+          <p:nvPr/>
+        </p:nvPicPr>
+        <p:blipFill>
+          <a:blip r:embed="rId3"/>
+          <a:stretch>
+            <a:fillRect/>
+          </a:stretch>
+        </p:blipFill>
+        <p:spPr>
+          <a:xfrm>
+            <a:off x="4170218" y="138863"/>
+            <a:ext cx="2601958" cy="2119428"/>
+          </a:xfrm>
+          <a:prstGeom prst="rect">
+            <a:avLst/>
+          </a:prstGeom>
+        </p:spPr>
+      </p:pic>
+      <p:pic>
+        <p:nvPicPr>
+          <p:cNvPr id="8" name="그림 7"/>
+          <p:cNvPicPr>
+            <a:picLocks noChangeAspect="1"/>
+          </p:cNvPicPr>
+          <p:nvPr/>
+        </p:nvPicPr>
+        <p:blipFill>
+          <a:blip r:embed="rId4"/>
+          <a:stretch>
+            <a:fillRect/>
+          </a:stretch>
+        </p:blipFill>
+        <p:spPr>
+          <a:xfrm>
+            <a:off x="625183" y="2724338"/>
+            <a:ext cx="6258798" cy="3515216"/>
+          </a:xfrm>
+          <a:prstGeom prst="rect">
+            <a:avLst/>
+          </a:prstGeom>
+        </p:spPr>
+      </p:pic>
+      <p:sp>
+        <p:nvSpPr>
+          <p:cNvPr id="9" name="직사각형 8"/>
+          <p:cNvSpPr/>
+          <p:nvPr/>
+        </p:nvSpPr>
+        <p:spPr>
+          <a:xfrm>
+            <a:off x="936912" y="5128755"/>
+            <a:ext cx="548385" cy="218485"/>
+          </a:xfrm>
+          <a:prstGeom prst="rect">
+            <a:avLst/>
+          </a:prstGeom>
+          <a:noFill/>
+          <a:ln w="28575">
+            <a:solidFill>
+              <a:srgbClr val="FF0000"/>
+            </a:solidFill>
+          </a:ln>
+        </p:spPr>
+        <p:style>
+          <a:lnRef idx="2">
+            <a:schemeClr val="accent1">
+              <a:shade val="50000"/>
+            </a:schemeClr>
+          </a:lnRef>
+          <a:fillRef idx="1">
+            <a:schemeClr val="accent1"/>
+          </a:fillRef>
+          <a:effectRef idx="0">
+            <a:schemeClr val="accent1"/>
+          </a:effectRef>
+          <a:fontRef idx="minor">
+            <a:schemeClr val="lt1"/>
+          </a:fontRef>
+        </p:style>
+        <p:txBody>
+          <a:bodyPr rtlCol="0" anchor="ctr"/>
+          <a:lstStyle/>
+          <a:p>
+            <a:pPr algn="ctr"/>
+            <a:endParaRPr lang="ko-KR" altLang="en-US"/>
+          </a:p>
+        </p:txBody>
+      </p:sp>
+      <p:sp>
+        <p:nvSpPr>
+          <p:cNvPr id="10" name="직사각형 9"/>
+          <p:cNvSpPr/>
+          <p:nvPr/>
+        </p:nvSpPr>
+        <p:spPr>
+          <a:xfrm>
+            <a:off x="1107671" y="5669090"/>
+            <a:ext cx="1564607" cy="218485"/>
+          </a:xfrm>
+          <a:prstGeom prst="rect">
+            <a:avLst/>
+          </a:prstGeom>
+          <a:noFill/>
+          <a:ln w="28575">
+            <a:solidFill>
+              <a:srgbClr val="FF0000"/>
+            </a:solidFill>
+          </a:ln>
+        </p:spPr>
+        <p:style>
+          <a:lnRef idx="2">
+            <a:schemeClr val="accent1">
+              <a:shade val="50000"/>
+            </a:schemeClr>
+          </a:lnRef>
+          <a:fillRef idx="1">
+            <a:schemeClr val="accent1"/>
+          </a:fillRef>
+          <a:effectRef idx="0">
+            <a:schemeClr val="accent1"/>
+          </a:effectRef>
+          <a:fontRef idx="minor">
+            <a:schemeClr val="lt1"/>
+          </a:fontRef>
+        </p:style>
+        <p:txBody>
+          <a:bodyPr rtlCol="0" anchor="ctr"/>
+          <a:lstStyle/>
+          <a:p>
+            <a:pPr algn="ctr"/>
+            <a:endParaRPr lang="ko-KR" altLang="en-US"/>
+          </a:p>
+        </p:txBody>
+      </p:sp>
+    </p:spTree>
+    <p:extLst>
+      <p:ext uri="{BB962C8B-B14F-4D97-AF65-F5344CB8AC3E}">
+        <p14:creationId xmlns:p14="http://schemas.microsoft.com/office/powerpoint/2010/main" val="3200653588"/>
+      </p:ext>
+    </p:extLst>
+  </p:cSld>
+  <p:clrMapOvr>
+    <a:masterClrMapping/>
+  </p:clrMapOvr>
+</p:sld>
+</file>
+
 <file path=ppt/slides/slide2.xml><?xml version="1.0" encoding="utf-8"?>
 <p:sld xmlns:a="http://schemas.openxmlformats.org/drawingml/2006/main" xmlns:r="http://schemas.openxmlformats.org/officeDocument/2006/relationships" xmlns:p="http://schemas.openxmlformats.org/presentationml/2006/main">
   <p:cSld>
@@ -4858,41 +5053,189 @@
           <a:chExt cx="0" cy="0"/>
         </a:xfrm>
       </p:grpSpPr>
-      <p:sp>
-        <p:nvSpPr>
-          <p:cNvPr id="2" name="제목 1"/>
-          <p:cNvSpPr>
-            <a:spLocks noGrp="1"/>
-          </p:cNvSpPr>
-          <p:nvPr>
-            <p:ph type="title"/>
-          </p:nvPr>
-        </p:nvSpPr>
-        <p:spPr/>
-        <p:txBody>
-          <a:bodyPr/>
-          <a:lstStyle/>
-          <a:p>
-            <a:endParaRPr lang="ko-KR" altLang="en-US"/>
-          </a:p>
-        </p:txBody>
-      </p:sp>
-      <p:sp>
-        <p:nvSpPr>
-          <p:cNvPr id="3" name="내용 개체 틀 2"/>
-          <p:cNvSpPr>
-            <a:spLocks noGrp="1"/>
-          </p:cNvSpPr>
-          <p:nvPr>
-            <p:ph idx="1"/>
-          </p:nvPr>
-        </p:nvSpPr>
-        <p:spPr/>
-        <p:txBody>
-          <a:bodyPr/>
-          <a:lstStyle/>
-          <a:p>
-            <a:endParaRPr lang="ko-KR" altLang="en-US" dirty="0"/>
+      <p:pic>
+        <p:nvPicPr>
+          <p:cNvPr id="4" name="그림 3"/>
+          <p:cNvPicPr>
+            <a:picLocks noChangeAspect="1"/>
+          </p:cNvPicPr>
+          <p:nvPr/>
+        </p:nvPicPr>
+        <p:blipFill>
+          <a:blip r:embed="rId2"/>
+          <a:stretch>
+            <a:fillRect/>
+          </a:stretch>
+        </p:blipFill>
+        <p:spPr>
+          <a:xfrm>
+            <a:off x="217353" y="548824"/>
+            <a:ext cx="6049219" cy="2324424"/>
+          </a:xfrm>
+          <a:prstGeom prst="rect">
+            <a:avLst/>
+          </a:prstGeom>
+        </p:spPr>
+      </p:pic>
+      <p:pic>
+        <p:nvPicPr>
+          <p:cNvPr id="5" name="그림 4"/>
+          <p:cNvPicPr>
+            <a:picLocks noChangeAspect="1"/>
+          </p:cNvPicPr>
+          <p:nvPr/>
+        </p:nvPicPr>
+        <p:blipFill>
+          <a:blip r:embed="rId3"/>
+          <a:stretch>
+            <a:fillRect/>
+          </a:stretch>
+        </p:blipFill>
+        <p:spPr>
+          <a:xfrm>
+            <a:off x="217353" y="3037942"/>
+            <a:ext cx="8068801" cy="3820058"/>
+          </a:xfrm>
+          <a:prstGeom prst="rect">
+            <a:avLst/>
+          </a:prstGeom>
+        </p:spPr>
+      </p:pic>
+      <p:sp>
+        <p:nvSpPr>
+          <p:cNvPr id="6" name="직사각형 5"/>
+          <p:cNvSpPr/>
+          <p:nvPr/>
+        </p:nvSpPr>
+        <p:spPr>
+          <a:xfrm>
+            <a:off x="549275" y="5225738"/>
+            <a:ext cx="603224" cy="218485"/>
+          </a:xfrm>
+          <a:prstGeom prst="rect">
+            <a:avLst/>
+          </a:prstGeom>
+          <a:noFill/>
+          <a:ln w="28575">
+            <a:solidFill>
+              <a:srgbClr val="FF0000"/>
+            </a:solidFill>
+          </a:ln>
+        </p:spPr>
+        <p:style>
+          <a:lnRef idx="2">
+            <a:schemeClr val="accent1">
+              <a:shade val="50000"/>
+            </a:schemeClr>
+          </a:lnRef>
+          <a:fillRef idx="1">
+            <a:schemeClr val="accent1"/>
+          </a:fillRef>
+          <a:effectRef idx="0">
+            <a:schemeClr val="accent1"/>
+          </a:effectRef>
+          <a:fontRef idx="minor">
+            <a:schemeClr val="lt1"/>
+          </a:fontRef>
+        </p:style>
+        <p:txBody>
+          <a:bodyPr rtlCol="0" anchor="ctr"/>
+          <a:lstStyle/>
+          <a:p>
+            <a:pPr algn="ctr"/>
+            <a:endParaRPr lang="ko-KR" altLang="en-US"/>
+          </a:p>
+        </p:txBody>
+      </p:sp>
+      <p:sp>
+        <p:nvSpPr>
+          <p:cNvPr id="7" name="직사각형 6"/>
+          <p:cNvSpPr/>
+          <p:nvPr/>
+        </p:nvSpPr>
+        <p:spPr>
+          <a:xfrm>
+            <a:off x="880357" y="6288617"/>
+            <a:ext cx="883180" cy="198623"/>
+          </a:xfrm>
+          <a:prstGeom prst="rect">
+            <a:avLst/>
+          </a:prstGeom>
+          <a:noFill/>
+          <a:ln w="28575">
+            <a:solidFill>
+              <a:srgbClr val="FF0000"/>
+            </a:solidFill>
+          </a:ln>
+        </p:spPr>
+        <p:style>
+          <a:lnRef idx="2">
+            <a:schemeClr val="accent1">
+              <a:shade val="50000"/>
+            </a:schemeClr>
+          </a:lnRef>
+          <a:fillRef idx="1">
+            <a:schemeClr val="accent1"/>
+          </a:fillRef>
+          <a:effectRef idx="0">
+            <a:schemeClr val="accent1"/>
+          </a:effectRef>
+          <a:fontRef idx="minor">
+            <a:schemeClr val="lt1"/>
+          </a:fontRef>
+        </p:style>
+        <p:txBody>
+          <a:bodyPr rtlCol="0" anchor="ctr"/>
+          <a:lstStyle/>
+          <a:p>
+            <a:pPr algn="ctr"/>
+            <a:endParaRPr lang="ko-KR" altLang="en-US"/>
+          </a:p>
+        </p:txBody>
+      </p:sp>
+      <p:sp>
+        <p:nvSpPr>
+          <p:cNvPr id="8" name="직사각형 7"/>
+          <p:cNvSpPr/>
+          <p:nvPr/>
+        </p:nvSpPr>
+        <p:spPr>
+          <a:xfrm>
+            <a:off x="1095674" y="6579565"/>
+            <a:ext cx="1422370" cy="198623"/>
+          </a:xfrm>
+          <a:prstGeom prst="rect">
+            <a:avLst/>
+          </a:prstGeom>
+          <a:noFill/>
+          <a:ln w="28575">
+            <a:solidFill>
+              <a:srgbClr val="FF0000"/>
+            </a:solidFill>
+          </a:ln>
+        </p:spPr>
+        <p:style>
+          <a:lnRef idx="2">
+            <a:schemeClr val="accent1">
+              <a:shade val="50000"/>
+            </a:schemeClr>
+          </a:lnRef>
+          <a:fillRef idx="1">
+            <a:schemeClr val="accent1"/>
+          </a:fillRef>
+          <a:effectRef idx="0">
+            <a:schemeClr val="accent1"/>
+          </a:effectRef>
+          <a:fontRef idx="minor">
+            <a:schemeClr val="lt1"/>
+          </a:fontRef>
+        </p:style>
+        <p:txBody>
+          <a:bodyPr rtlCol="0" anchor="ctr"/>
+          <a:lstStyle/>
+          <a:p>
+            <a:pPr algn="ctr"/>
+            <a:endParaRPr lang="ko-KR" altLang="en-US"/>
           </a:p>
         </p:txBody>
       </p:sp>

</xml_diff>

<commit_message>
JPA Entity 연관관계 update
</commit_message>
<xml_diff>
--- a/Spring-Springboot/스프링 프레임워크 학습자료.pptx
+++ b/Spring-Springboot/스프링 프레임워크 학습자료.pptx
@@ -20,6 +20,24 @@
     <p:sldId id="269" r:id="rId14"/>
     <p:sldId id="270" r:id="rId15"/>
     <p:sldId id="268" r:id="rId16"/>
+    <p:sldId id="271" r:id="rId17"/>
+    <p:sldId id="272" r:id="rId18"/>
+    <p:sldId id="273" r:id="rId19"/>
+    <p:sldId id="274" r:id="rId20"/>
+    <p:sldId id="275" r:id="rId21"/>
+    <p:sldId id="276" r:id="rId22"/>
+    <p:sldId id="277" r:id="rId23"/>
+    <p:sldId id="278" r:id="rId24"/>
+    <p:sldId id="279" r:id="rId25"/>
+    <p:sldId id="280" r:id="rId26"/>
+    <p:sldId id="281" r:id="rId27"/>
+    <p:sldId id="282" r:id="rId28"/>
+    <p:sldId id="283" r:id="rId29"/>
+    <p:sldId id="284" r:id="rId30"/>
+    <p:sldId id="285" r:id="rId31"/>
+    <p:sldId id="286" r:id="rId32"/>
+    <p:sldId id="287" r:id="rId33"/>
+    <p:sldId id="288" r:id="rId34"/>
   </p:sldIdLst>
   <p:sldSz cx="12192000" cy="6858000"/>
   <p:notesSz cx="6858000" cy="9144000"/>
@@ -257,7 +275,7 @@
           <a:p>
             <a:fld id="{939B0B54-38C2-4878-9BDB-D65EE6D99877}" type="datetimeFigureOut">
               <a:rPr lang="ko-KR" altLang="en-US" smtClean="0"/>
-              <a:t>2020-01-30</a:t>
+              <a:t>2020-02-02</a:t>
             </a:fld>
             <a:endParaRPr lang="ko-KR" altLang="en-US"/>
           </a:p>
@@ -427,7 +445,7 @@
           <a:p>
             <a:fld id="{939B0B54-38C2-4878-9BDB-D65EE6D99877}" type="datetimeFigureOut">
               <a:rPr lang="ko-KR" altLang="en-US" smtClean="0"/>
-              <a:t>2020-01-30</a:t>
+              <a:t>2020-02-02</a:t>
             </a:fld>
             <a:endParaRPr lang="ko-KR" altLang="en-US"/>
           </a:p>
@@ -607,7 +625,7 @@
           <a:p>
             <a:fld id="{939B0B54-38C2-4878-9BDB-D65EE6D99877}" type="datetimeFigureOut">
               <a:rPr lang="ko-KR" altLang="en-US" smtClean="0"/>
-              <a:t>2020-01-30</a:t>
+              <a:t>2020-02-02</a:t>
             </a:fld>
             <a:endParaRPr lang="ko-KR" altLang="en-US"/>
           </a:p>
@@ -777,7 +795,7 @@
           <a:p>
             <a:fld id="{939B0B54-38C2-4878-9BDB-D65EE6D99877}" type="datetimeFigureOut">
               <a:rPr lang="ko-KR" altLang="en-US" smtClean="0"/>
-              <a:t>2020-01-30</a:t>
+              <a:t>2020-02-02</a:t>
             </a:fld>
             <a:endParaRPr lang="ko-KR" altLang="en-US"/>
           </a:p>
@@ -1023,7 +1041,7 @@
           <a:p>
             <a:fld id="{939B0B54-38C2-4878-9BDB-D65EE6D99877}" type="datetimeFigureOut">
               <a:rPr lang="ko-KR" altLang="en-US" smtClean="0"/>
-              <a:t>2020-01-30</a:t>
+              <a:t>2020-02-02</a:t>
             </a:fld>
             <a:endParaRPr lang="ko-KR" altLang="en-US"/>
           </a:p>
@@ -1255,7 +1273,7 @@
           <a:p>
             <a:fld id="{939B0B54-38C2-4878-9BDB-D65EE6D99877}" type="datetimeFigureOut">
               <a:rPr lang="ko-KR" altLang="en-US" smtClean="0"/>
-              <a:t>2020-01-30</a:t>
+              <a:t>2020-02-02</a:t>
             </a:fld>
             <a:endParaRPr lang="ko-KR" altLang="en-US"/>
           </a:p>
@@ -1622,7 +1640,7 @@
           <a:p>
             <a:fld id="{939B0B54-38C2-4878-9BDB-D65EE6D99877}" type="datetimeFigureOut">
               <a:rPr lang="ko-KR" altLang="en-US" smtClean="0"/>
-              <a:t>2020-01-30</a:t>
+              <a:t>2020-02-02</a:t>
             </a:fld>
             <a:endParaRPr lang="ko-KR" altLang="en-US"/>
           </a:p>
@@ -1740,7 +1758,7 @@
           <a:p>
             <a:fld id="{939B0B54-38C2-4878-9BDB-D65EE6D99877}" type="datetimeFigureOut">
               <a:rPr lang="ko-KR" altLang="en-US" smtClean="0"/>
-              <a:t>2020-01-30</a:t>
+              <a:t>2020-02-02</a:t>
             </a:fld>
             <a:endParaRPr lang="ko-KR" altLang="en-US"/>
           </a:p>
@@ -1835,7 +1853,7 @@
           <a:p>
             <a:fld id="{939B0B54-38C2-4878-9BDB-D65EE6D99877}" type="datetimeFigureOut">
               <a:rPr lang="ko-KR" altLang="en-US" smtClean="0"/>
-              <a:t>2020-01-30</a:t>
+              <a:t>2020-02-02</a:t>
             </a:fld>
             <a:endParaRPr lang="ko-KR" altLang="en-US"/>
           </a:p>
@@ -2112,7 +2130,7 @@
           <a:p>
             <a:fld id="{939B0B54-38C2-4878-9BDB-D65EE6D99877}" type="datetimeFigureOut">
               <a:rPr lang="ko-KR" altLang="en-US" smtClean="0"/>
-              <a:t>2020-01-30</a:t>
+              <a:t>2020-02-02</a:t>
             </a:fld>
             <a:endParaRPr lang="ko-KR" altLang="en-US"/>
           </a:p>
@@ -2365,7 +2383,7 @@
           <a:p>
             <a:fld id="{939B0B54-38C2-4878-9BDB-D65EE6D99877}" type="datetimeFigureOut">
               <a:rPr lang="ko-KR" altLang="en-US" smtClean="0"/>
-              <a:t>2020-01-30</a:t>
+              <a:t>2020-02-02</a:t>
             </a:fld>
             <a:endParaRPr lang="ko-KR" altLang="en-US"/>
           </a:p>
@@ -2578,7 +2596,7 @@
           <a:p>
             <a:fld id="{939B0B54-38C2-4878-9BDB-D65EE6D99877}" type="datetimeFigureOut">
               <a:rPr lang="ko-KR" altLang="en-US" smtClean="0"/>
-              <a:t>2020-01-30</a:t>
+              <a:t>2020-02-02</a:t>
             </a:fld>
             <a:endParaRPr lang="ko-KR" altLang="en-US"/>
           </a:p>
@@ -4392,6 +4410,826 @@
 </p:sld>
 </file>
 
+<file path=ppt/slides/slide16.xml><?xml version="1.0" encoding="utf-8"?>
+<p:sld xmlns:a="http://schemas.openxmlformats.org/drawingml/2006/main" xmlns:r="http://schemas.openxmlformats.org/officeDocument/2006/relationships" xmlns:p="http://schemas.openxmlformats.org/presentationml/2006/main">
+  <p:cSld>
+    <p:spTree>
+      <p:nvGrpSpPr>
+        <p:cNvPr id="1" name=""/>
+        <p:cNvGrpSpPr/>
+        <p:nvPr/>
+      </p:nvGrpSpPr>
+      <p:grpSpPr>
+        <a:xfrm>
+          <a:off x="0" y="0"/>
+          <a:ext cx="0" cy="0"/>
+          <a:chOff x="0" y="0"/>
+          <a:chExt cx="0" cy="0"/>
+        </a:xfrm>
+      </p:grpSpPr>
+      <p:pic>
+        <p:nvPicPr>
+          <p:cNvPr id="4" name="그림 3"/>
+          <p:cNvPicPr>
+            <a:picLocks noChangeAspect="1"/>
+          </p:cNvPicPr>
+          <p:nvPr/>
+        </p:nvPicPr>
+        <p:blipFill>
+          <a:blip r:embed="rId2"/>
+          <a:stretch>
+            <a:fillRect/>
+          </a:stretch>
+        </p:blipFill>
+        <p:spPr>
+          <a:xfrm>
+            <a:off x="0" y="0"/>
+            <a:ext cx="2042337" cy="2621507"/>
+          </a:xfrm>
+          <a:prstGeom prst="rect">
+            <a:avLst/>
+          </a:prstGeom>
+        </p:spPr>
+      </p:pic>
+      <p:sp>
+        <p:nvSpPr>
+          <p:cNvPr id="5" name="직사각형 4"/>
+          <p:cNvSpPr/>
+          <p:nvPr/>
+        </p:nvSpPr>
+        <p:spPr>
+          <a:xfrm>
+            <a:off x="902888" y="1389226"/>
+            <a:ext cx="1091822" cy="229385"/>
+          </a:xfrm>
+          <a:prstGeom prst="rect">
+            <a:avLst/>
+          </a:prstGeom>
+          <a:noFill/>
+          <a:ln w="28575">
+            <a:solidFill>
+              <a:srgbClr val="FF0000"/>
+            </a:solidFill>
+          </a:ln>
+        </p:spPr>
+        <p:style>
+          <a:lnRef idx="2">
+            <a:schemeClr val="accent1">
+              <a:shade val="50000"/>
+            </a:schemeClr>
+          </a:lnRef>
+          <a:fillRef idx="1">
+            <a:schemeClr val="accent1"/>
+          </a:fillRef>
+          <a:effectRef idx="0">
+            <a:schemeClr val="accent1"/>
+          </a:effectRef>
+          <a:fontRef idx="minor">
+            <a:schemeClr val="lt1"/>
+          </a:fontRef>
+        </p:style>
+        <p:txBody>
+          <a:bodyPr rtlCol="0" anchor="ctr"/>
+          <a:lstStyle/>
+          <a:p>
+            <a:pPr algn="ctr"/>
+            <a:endParaRPr lang="ko-KR" altLang="en-US"/>
+          </a:p>
+        </p:txBody>
+      </p:sp>
+      <p:pic>
+        <p:nvPicPr>
+          <p:cNvPr id="6" name="그림 5"/>
+          <p:cNvPicPr>
+            <a:picLocks noChangeAspect="1"/>
+          </p:cNvPicPr>
+          <p:nvPr/>
+        </p:nvPicPr>
+        <p:blipFill>
+          <a:blip r:embed="rId3"/>
+          <a:stretch>
+            <a:fillRect/>
+          </a:stretch>
+        </p:blipFill>
+        <p:spPr>
+          <a:xfrm>
+            <a:off x="3788602" y="763538"/>
+            <a:ext cx="3394928" cy="1471851"/>
+          </a:xfrm>
+          <a:prstGeom prst="rect">
+            <a:avLst/>
+          </a:prstGeom>
+        </p:spPr>
+      </p:pic>
+      <p:pic>
+        <p:nvPicPr>
+          <p:cNvPr id="7" name="그림 6"/>
+          <p:cNvPicPr>
+            <a:picLocks noChangeAspect="1"/>
+          </p:cNvPicPr>
+          <p:nvPr/>
+        </p:nvPicPr>
+        <p:blipFill>
+          <a:blip r:embed="rId4"/>
+          <a:stretch>
+            <a:fillRect/>
+          </a:stretch>
+        </p:blipFill>
+        <p:spPr>
+          <a:xfrm>
+            <a:off x="2592571" y="2621507"/>
+            <a:ext cx="7689246" cy="3680779"/>
+          </a:xfrm>
+          <a:prstGeom prst="rect">
+            <a:avLst/>
+          </a:prstGeom>
+        </p:spPr>
+      </p:pic>
+      <p:sp>
+        <p:nvSpPr>
+          <p:cNvPr id="8" name="직사각형 7"/>
+          <p:cNvSpPr/>
+          <p:nvPr/>
+        </p:nvSpPr>
+        <p:spPr>
+          <a:xfrm>
+            <a:off x="3447151" y="5130997"/>
+            <a:ext cx="2340416" cy="229385"/>
+          </a:xfrm>
+          <a:prstGeom prst="rect">
+            <a:avLst/>
+          </a:prstGeom>
+          <a:noFill/>
+          <a:ln w="28575">
+            <a:solidFill>
+              <a:srgbClr val="FF0000"/>
+            </a:solidFill>
+          </a:ln>
+        </p:spPr>
+        <p:style>
+          <a:lnRef idx="2">
+            <a:schemeClr val="accent1">
+              <a:shade val="50000"/>
+            </a:schemeClr>
+          </a:lnRef>
+          <a:fillRef idx="1">
+            <a:schemeClr val="accent1"/>
+          </a:fillRef>
+          <a:effectRef idx="0">
+            <a:schemeClr val="accent1"/>
+          </a:effectRef>
+          <a:fontRef idx="minor">
+            <a:schemeClr val="lt1"/>
+          </a:fontRef>
+        </p:style>
+        <p:txBody>
+          <a:bodyPr rtlCol="0" anchor="ctr"/>
+          <a:lstStyle/>
+          <a:p>
+            <a:pPr algn="ctr"/>
+            <a:endParaRPr lang="ko-KR" altLang="en-US"/>
+          </a:p>
+        </p:txBody>
+      </p:sp>
+      <p:sp>
+        <p:nvSpPr>
+          <p:cNvPr id="9" name="직사각형 8"/>
+          <p:cNvSpPr/>
+          <p:nvPr/>
+        </p:nvSpPr>
+        <p:spPr>
+          <a:xfrm>
+            <a:off x="3169691" y="5815665"/>
+            <a:ext cx="1453214" cy="229385"/>
+          </a:xfrm>
+          <a:prstGeom prst="rect">
+            <a:avLst/>
+          </a:prstGeom>
+          <a:noFill/>
+          <a:ln w="28575">
+            <a:solidFill>
+              <a:srgbClr val="FF0000"/>
+            </a:solidFill>
+          </a:ln>
+        </p:spPr>
+        <p:style>
+          <a:lnRef idx="2">
+            <a:schemeClr val="accent1">
+              <a:shade val="50000"/>
+            </a:schemeClr>
+          </a:lnRef>
+          <a:fillRef idx="1">
+            <a:schemeClr val="accent1"/>
+          </a:fillRef>
+          <a:effectRef idx="0">
+            <a:schemeClr val="accent1"/>
+          </a:effectRef>
+          <a:fontRef idx="minor">
+            <a:schemeClr val="lt1"/>
+          </a:fontRef>
+        </p:style>
+        <p:txBody>
+          <a:bodyPr rtlCol="0" anchor="ctr"/>
+          <a:lstStyle/>
+          <a:p>
+            <a:pPr algn="ctr"/>
+            <a:endParaRPr lang="ko-KR" altLang="en-US"/>
+          </a:p>
+        </p:txBody>
+      </p:sp>
+    </p:spTree>
+    <p:extLst>
+      <p:ext uri="{BB962C8B-B14F-4D97-AF65-F5344CB8AC3E}">
+        <p14:creationId xmlns:p14="http://schemas.microsoft.com/office/powerpoint/2010/main" val="2692544905"/>
+      </p:ext>
+    </p:extLst>
+  </p:cSld>
+  <p:clrMapOvr>
+    <a:masterClrMapping/>
+  </p:clrMapOvr>
+</p:sld>
+</file>
+
+<file path=ppt/slides/slide17.xml><?xml version="1.0" encoding="utf-8"?>
+<p:sld xmlns:a="http://schemas.openxmlformats.org/drawingml/2006/main" xmlns:r="http://schemas.openxmlformats.org/officeDocument/2006/relationships" xmlns:p="http://schemas.openxmlformats.org/presentationml/2006/main">
+  <p:cSld>
+    <p:spTree>
+      <p:nvGrpSpPr>
+        <p:cNvPr id="1" name=""/>
+        <p:cNvGrpSpPr/>
+        <p:nvPr/>
+      </p:nvGrpSpPr>
+      <p:grpSpPr>
+        <a:xfrm>
+          <a:off x="0" y="0"/>
+          <a:ext cx="0" cy="0"/>
+          <a:chOff x="0" y="0"/>
+          <a:chExt cx="0" cy="0"/>
+        </a:xfrm>
+      </p:grpSpPr>
+      <p:pic>
+        <p:nvPicPr>
+          <p:cNvPr id="3" name="그림 2"/>
+          <p:cNvPicPr>
+            <a:picLocks noChangeAspect="1"/>
+          </p:cNvPicPr>
+          <p:nvPr/>
+        </p:nvPicPr>
+        <p:blipFill>
+          <a:blip r:embed="rId2"/>
+          <a:stretch>
+            <a:fillRect/>
+          </a:stretch>
+        </p:blipFill>
+        <p:spPr>
+          <a:xfrm>
+            <a:off x="181121" y="110842"/>
+            <a:ext cx="11720576" cy="3688400"/>
+          </a:xfrm>
+          <a:prstGeom prst="rect">
+            <a:avLst/>
+          </a:prstGeom>
+        </p:spPr>
+      </p:pic>
+      <p:pic>
+        <p:nvPicPr>
+          <p:cNvPr id="4" name="그림 3"/>
+          <p:cNvPicPr>
+            <a:picLocks noChangeAspect="1"/>
+          </p:cNvPicPr>
+          <p:nvPr/>
+        </p:nvPicPr>
+        <p:blipFill>
+          <a:blip r:embed="rId3"/>
+          <a:stretch>
+            <a:fillRect/>
+          </a:stretch>
+        </p:blipFill>
+        <p:spPr>
+          <a:xfrm>
+            <a:off x="413551" y="3799242"/>
+            <a:ext cx="11255715" cy="2857748"/>
+          </a:xfrm>
+          <a:prstGeom prst="rect">
+            <a:avLst/>
+          </a:prstGeom>
+        </p:spPr>
+      </p:pic>
+      <p:sp>
+        <p:nvSpPr>
+          <p:cNvPr id="5" name="직사각형 4"/>
+          <p:cNvSpPr/>
+          <p:nvPr/>
+        </p:nvSpPr>
+        <p:spPr>
+          <a:xfrm>
+            <a:off x="5328922" y="5437940"/>
+            <a:ext cx="1934228" cy="871096"/>
+          </a:xfrm>
+          <a:prstGeom prst="rect">
+            <a:avLst/>
+          </a:prstGeom>
+          <a:noFill/>
+          <a:ln w="28575">
+            <a:solidFill>
+              <a:srgbClr val="FF0000"/>
+            </a:solidFill>
+          </a:ln>
+        </p:spPr>
+        <p:style>
+          <a:lnRef idx="2">
+            <a:schemeClr val="accent1">
+              <a:shade val="50000"/>
+            </a:schemeClr>
+          </a:lnRef>
+          <a:fillRef idx="1">
+            <a:schemeClr val="accent1"/>
+          </a:fillRef>
+          <a:effectRef idx="0">
+            <a:schemeClr val="accent1"/>
+          </a:effectRef>
+          <a:fontRef idx="minor">
+            <a:schemeClr val="lt1"/>
+          </a:fontRef>
+        </p:style>
+        <p:txBody>
+          <a:bodyPr rtlCol="0" anchor="ctr"/>
+          <a:lstStyle/>
+          <a:p>
+            <a:pPr algn="ctr"/>
+            <a:endParaRPr lang="ko-KR" altLang="en-US"/>
+          </a:p>
+        </p:txBody>
+      </p:sp>
+      <p:sp>
+        <p:nvSpPr>
+          <p:cNvPr id="6" name="직사각형 5"/>
+          <p:cNvSpPr/>
+          <p:nvPr/>
+        </p:nvSpPr>
+        <p:spPr>
+          <a:xfrm>
+            <a:off x="5503462" y="2369461"/>
+            <a:ext cx="1453214" cy="871096"/>
+          </a:xfrm>
+          <a:prstGeom prst="rect">
+            <a:avLst/>
+          </a:prstGeom>
+          <a:noFill/>
+          <a:ln w="28575">
+            <a:solidFill>
+              <a:srgbClr val="FF0000"/>
+            </a:solidFill>
+          </a:ln>
+        </p:spPr>
+        <p:style>
+          <a:lnRef idx="2">
+            <a:schemeClr val="accent1">
+              <a:shade val="50000"/>
+            </a:schemeClr>
+          </a:lnRef>
+          <a:fillRef idx="1">
+            <a:schemeClr val="accent1"/>
+          </a:fillRef>
+          <a:effectRef idx="0">
+            <a:schemeClr val="accent1"/>
+          </a:effectRef>
+          <a:fontRef idx="minor">
+            <a:schemeClr val="lt1"/>
+          </a:fontRef>
+        </p:style>
+        <p:txBody>
+          <a:bodyPr rtlCol="0" anchor="ctr"/>
+          <a:lstStyle/>
+          <a:p>
+            <a:pPr algn="ctr"/>
+            <a:endParaRPr lang="ko-KR" altLang="en-US"/>
+          </a:p>
+        </p:txBody>
+      </p:sp>
+      <p:sp>
+        <p:nvSpPr>
+          <p:cNvPr id="7" name="직사각형 6"/>
+          <p:cNvSpPr/>
+          <p:nvPr/>
+        </p:nvSpPr>
+        <p:spPr>
+          <a:xfrm>
+            <a:off x="1865747" y="1426556"/>
+            <a:ext cx="2127651" cy="277558"/>
+          </a:xfrm>
+          <a:prstGeom prst="rect">
+            <a:avLst/>
+          </a:prstGeom>
+          <a:noFill/>
+          <a:ln w="28575">
+            <a:solidFill>
+              <a:srgbClr val="FF0000"/>
+            </a:solidFill>
+          </a:ln>
+        </p:spPr>
+        <p:style>
+          <a:lnRef idx="2">
+            <a:schemeClr val="accent1">
+              <a:shade val="50000"/>
+            </a:schemeClr>
+          </a:lnRef>
+          <a:fillRef idx="1">
+            <a:schemeClr val="accent1"/>
+          </a:fillRef>
+          <a:effectRef idx="0">
+            <a:schemeClr val="accent1"/>
+          </a:effectRef>
+          <a:fontRef idx="minor">
+            <a:schemeClr val="lt1"/>
+          </a:fontRef>
+        </p:style>
+        <p:txBody>
+          <a:bodyPr rtlCol="0" anchor="ctr"/>
+          <a:lstStyle/>
+          <a:p>
+            <a:pPr algn="ctr"/>
+            <a:endParaRPr lang="ko-KR" altLang="en-US"/>
+          </a:p>
+        </p:txBody>
+      </p:sp>
+      <p:sp>
+        <p:nvSpPr>
+          <p:cNvPr id="8" name="직사각형 7"/>
+          <p:cNvSpPr/>
+          <p:nvPr/>
+        </p:nvSpPr>
+        <p:spPr>
+          <a:xfrm>
+            <a:off x="598080" y="1428830"/>
+            <a:ext cx="1201004" cy="277558"/>
+          </a:xfrm>
+          <a:prstGeom prst="rect">
+            <a:avLst/>
+          </a:prstGeom>
+          <a:noFill/>
+          <a:ln w="28575">
+            <a:solidFill>
+              <a:srgbClr val="FF0000"/>
+            </a:solidFill>
+          </a:ln>
+        </p:spPr>
+        <p:style>
+          <a:lnRef idx="2">
+            <a:schemeClr val="accent1">
+              <a:shade val="50000"/>
+            </a:schemeClr>
+          </a:lnRef>
+          <a:fillRef idx="1">
+            <a:schemeClr val="accent1"/>
+          </a:fillRef>
+          <a:effectRef idx="0">
+            <a:schemeClr val="accent1"/>
+          </a:effectRef>
+          <a:fontRef idx="minor">
+            <a:schemeClr val="lt1"/>
+          </a:fontRef>
+        </p:style>
+        <p:txBody>
+          <a:bodyPr rtlCol="0" anchor="ctr"/>
+          <a:lstStyle/>
+          <a:p>
+            <a:pPr algn="ctr"/>
+            <a:endParaRPr lang="ko-KR" altLang="en-US"/>
+          </a:p>
+        </p:txBody>
+      </p:sp>
+    </p:spTree>
+    <p:extLst>
+      <p:ext uri="{BB962C8B-B14F-4D97-AF65-F5344CB8AC3E}">
+        <p14:creationId xmlns:p14="http://schemas.microsoft.com/office/powerpoint/2010/main" val="3181514304"/>
+      </p:ext>
+    </p:extLst>
+  </p:cSld>
+  <p:clrMapOvr>
+    <a:masterClrMapping/>
+  </p:clrMapOvr>
+</p:sld>
+</file>
+
+<file path=ppt/slides/slide18.xml><?xml version="1.0" encoding="utf-8"?>
+<p:sld xmlns:a="http://schemas.openxmlformats.org/drawingml/2006/main" xmlns:r="http://schemas.openxmlformats.org/officeDocument/2006/relationships" xmlns:p="http://schemas.openxmlformats.org/presentationml/2006/main">
+  <p:cSld>
+    <p:spTree>
+      <p:nvGrpSpPr>
+        <p:cNvPr id="1" name=""/>
+        <p:cNvGrpSpPr/>
+        <p:nvPr/>
+      </p:nvGrpSpPr>
+      <p:grpSpPr>
+        <a:xfrm>
+          <a:off x="0" y="0"/>
+          <a:ext cx="0" cy="0"/>
+          <a:chOff x="0" y="0"/>
+          <a:chExt cx="0" cy="0"/>
+        </a:xfrm>
+      </p:grpSpPr>
+      <p:pic>
+        <p:nvPicPr>
+          <p:cNvPr id="2" name="그림 1"/>
+          <p:cNvPicPr>
+            <a:picLocks noChangeAspect="1"/>
+          </p:cNvPicPr>
+          <p:nvPr/>
+        </p:nvPicPr>
+        <p:blipFill>
+          <a:blip r:embed="rId2"/>
+          <a:stretch>
+            <a:fillRect/>
+          </a:stretch>
+        </p:blipFill>
+        <p:spPr>
+          <a:xfrm>
+            <a:off x="-366266" y="-276366"/>
+            <a:ext cx="4671465" cy="1463167"/>
+          </a:xfrm>
+          <a:prstGeom prst="rect">
+            <a:avLst/>
+          </a:prstGeom>
+        </p:spPr>
+      </p:pic>
+      <p:sp>
+        <p:nvSpPr>
+          <p:cNvPr id="3" name="직사각형 2"/>
+          <p:cNvSpPr/>
+          <p:nvPr/>
+        </p:nvSpPr>
+        <p:spPr>
+          <a:xfrm>
+            <a:off x="466590" y="857323"/>
+            <a:ext cx="1321104" cy="277558"/>
+          </a:xfrm>
+          <a:prstGeom prst="rect">
+            <a:avLst/>
+          </a:prstGeom>
+          <a:noFill/>
+          <a:ln w="28575">
+            <a:solidFill>
+              <a:srgbClr val="FF0000"/>
+            </a:solidFill>
+          </a:ln>
+        </p:spPr>
+        <p:style>
+          <a:lnRef idx="2">
+            <a:schemeClr val="accent1">
+              <a:shade val="50000"/>
+            </a:schemeClr>
+          </a:lnRef>
+          <a:fillRef idx="1">
+            <a:schemeClr val="accent1"/>
+          </a:fillRef>
+          <a:effectRef idx="0">
+            <a:schemeClr val="accent1"/>
+          </a:effectRef>
+          <a:fontRef idx="minor">
+            <a:schemeClr val="lt1"/>
+          </a:fontRef>
+        </p:style>
+        <p:txBody>
+          <a:bodyPr rtlCol="0" anchor="ctr"/>
+          <a:lstStyle/>
+          <a:p>
+            <a:pPr algn="ctr"/>
+            <a:endParaRPr lang="ko-KR" altLang="en-US"/>
+          </a:p>
+        </p:txBody>
+      </p:sp>
+      <p:pic>
+        <p:nvPicPr>
+          <p:cNvPr id="4" name="그림 3"/>
+          <p:cNvPicPr>
+            <a:picLocks noChangeAspect="1"/>
+          </p:cNvPicPr>
+          <p:nvPr/>
+        </p:nvPicPr>
+        <p:blipFill>
+          <a:blip r:embed="rId3"/>
+          <a:stretch>
+            <a:fillRect/>
+          </a:stretch>
+        </p:blipFill>
+        <p:spPr>
+          <a:xfrm>
+            <a:off x="7401682" y="239966"/>
+            <a:ext cx="4503810" cy="1318374"/>
+          </a:xfrm>
+          <a:prstGeom prst="rect">
+            <a:avLst/>
+          </a:prstGeom>
+        </p:spPr>
+      </p:pic>
+      <p:pic>
+        <p:nvPicPr>
+          <p:cNvPr id="5" name="그림 4"/>
+          <p:cNvPicPr>
+            <a:picLocks noChangeAspect="1"/>
+          </p:cNvPicPr>
+          <p:nvPr/>
+        </p:nvPicPr>
+        <p:blipFill>
+          <a:blip r:embed="rId4"/>
+          <a:stretch>
+            <a:fillRect/>
+          </a:stretch>
+        </p:blipFill>
+        <p:spPr>
+          <a:xfrm>
+            <a:off x="4776460" y="176630"/>
+            <a:ext cx="3296735" cy="958251"/>
+          </a:xfrm>
+          <a:prstGeom prst="rect">
+            <a:avLst/>
+          </a:prstGeom>
+        </p:spPr>
+      </p:pic>
+      <p:pic>
+        <p:nvPicPr>
+          <p:cNvPr id="7" name="그림 6"/>
+          <p:cNvPicPr>
+            <a:picLocks noChangeAspect="1"/>
+          </p:cNvPicPr>
+          <p:nvPr/>
+        </p:nvPicPr>
+        <p:blipFill>
+          <a:blip r:embed="rId5"/>
+          <a:stretch>
+            <a:fillRect/>
+          </a:stretch>
+        </p:blipFill>
+        <p:spPr>
+          <a:xfrm>
+            <a:off x="-2682473" y="1134881"/>
+            <a:ext cx="5364945" cy="2994920"/>
+          </a:xfrm>
+          <a:prstGeom prst="rect">
+            <a:avLst/>
+          </a:prstGeom>
+        </p:spPr>
+      </p:pic>
+      <p:sp>
+        <p:nvSpPr>
+          <p:cNvPr id="8" name="직사각형 7"/>
+          <p:cNvSpPr/>
+          <p:nvPr/>
+        </p:nvSpPr>
+        <p:spPr>
+          <a:xfrm>
+            <a:off x="390394" y="3087363"/>
+            <a:ext cx="1321104" cy="208533"/>
+          </a:xfrm>
+          <a:prstGeom prst="rect">
+            <a:avLst/>
+          </a:prstGeom>
+          <a:noFill/>
+          <a:ln w="28575">
+            <a:solidFill>
+              <a:srgbClr val="FF0000"/>
+            </a:solidFill>
+          </a:ln>
+        </p:spPr>
+        <p:style>
+          <a:lnRef idx="2">
+            <a:schemeClr val="accent1">
+              <a:shade val="50000"/>
+            </a:schemeClr>
+          </a:lnRef>
+          <a:fillRef idx="1">
+            <a:schemeClr val="accent1"/>
+          </a:fillRef>
+          <a:effectRef idx="0">
+            <a:schemeClr val="accent1"/>
+          </a:effectRef>
+          <a:fontRef idx="minor">
+            <a:schemeClr val="lt1"/>
+          </a:fontRef>
+        </p:style>
+        <p:txBody>
+          <a:bodyPr rtlCol="0" anchor="ctr"/>
+          <a:lstStyle/>
+          <a:p>
+            <a:pPr algn="ctr"/>
+            <a:endParaRPr lang="ko-KR" altLang="en-US"/>
+          </a:p>
+        </p:txBody>
+      </p:sp>
+      <p:pic>
+        <p:nvPicPr>
+          <p:cNvPr id="10" name="그림 9"/>
+          <p:cNvPicPr>
+            <a:picLocks noChangeAspect="1"/>
+          </p:cNvPicPr>
+          <p:nvPr/>
+        </p:nvPicPr>
+        <p:blipFill>
+          <a:blip r:embed="rId6"/>
+          <a:stretch>
+            <a:fillRect/>
+          </a:stretch>
+        </p:blipFill>
+        <p:spPr>
+          <a:xfrm>
+            <a:off x="6203947" y="1775593"/>
+            <a:ext cx="5098222" cy="4099915"/>
+          </a:xfrm>
+          <a:prstGeom prst="rect">
+            <a:avLst/>
+          </a:prstGeom>
+        </p:spPr>
+      </p:pic>
+      <p:sp>
+        <p:nvSpPr>
+          <p:cNvPr id="11" name="직사각형 10"/>
+          <p:cNvSpPr/>
+          <p:nvPr/>
+        </p:nvSpPr>
+        <p:spPr>
+          <a:xfrm>
+            <a:off x="8064292" y="4841056"/>
+            <a:ext cx="1453214" cy="406373"/>
+          </a:xfrm>
+          <a:prstGeom prst="rect">
+            <a:avLst/>
+          </a:prstGeom>
+          <a:noFill/>
+          <a:ln w="28575">
+            <a:solidFill>
+              <a:srgbClr val="FF0000"/>
+            </a:solidFill>
+          </a:ln>
+        </p:spPr>
+        <p:style>
+          <a:lnRef idx="2">
+            <a:schemeClr val="accent1">
+              <a:shade val="50000"/>
+            </a:schemeClr>
+          </a:lnRef>
+          <a:fillRef idx="1">
+            <a:schemeClr val="accent1"/>
+          </a:fillRef>
+          <a:effectRef idx="0">
+            <a:schemeClr val="accent1"/>
+          </a:effectRef>
+          <a:fontRef idx="minor">
+            <a:schemeClr val="lt1"/>
+          </a:fontRef>
+        </p:style>
+        <p:txBody>
+          <a:bodyPr rtlCol="0" anchor="ctr"/>
+          <a:lstStyle/>
+          <a:p>
+            <a:pPr algn="ctr"/>
+            <a:endParaRPr lang="ko-KR" altLang="en-US"/>
+          </a:p>
+        </p:txBody>
+      </p:sp>
+    </p:spTree>
+    <p:extLst>
+      <p:ext uri="{BB962C8B-B14F-4D97-AF65-F5344CB8AC3E}">
+        <p14:creationId xmlns:p14="http://schemas.microsoft.com/office/powerpoint/2010/main" val="1675681846"/>
+      </p:ext>
+    </p:extLst>
+  </p:cSld>
+  <p:clrMapOvr>
+    <a:masterClrMapping/>
+  </p:clrMapOvr>
+</p:sld>
+</file>
+
+<file path=ppt/slides/slide19.xml><?xml version="1.0" encoding="utf-8"?>
+<p:sld xmlns:a="http://schemas.openxmlformats.org/drawingml/2006/main" xmlns:r="http://schemas.openxmlformats.org/officeDocument/2006/relationships" xmlns:p="http://schemas.openxmlformats.org/presentationml/2006/main">
+  <p:cSld>
+    <p:spTree>
+      <p:nvGrpSpPr>
+        <p:cNvPr id="1" name=""/>
+        <p:cNvGrpSpPr/>
+        <p:nvPr/>
+      </p:nvGrpSpPr>
+      <p:grpSpPr>
+        <a:xfrm>
+          <a:off x="0" y="0"/>
+          <a:ext cx="0" cy="0"/>
+          <a:chOff x="0" y="0"/>
+          <a:chExt cx="0" cy="0"/>
+        </a:xfrm>
+      </p:grpSpPr>
+    </p:spTree>
+    <p:extLst>
+      <p:ext uri="{BB962C8B-B14F-4D97-AF65-F5344CB8AC3E}">
+        <p14:creationId xmlns:p14="http://schemas.microsoft.com/office/powerpoint/2010/main" val="747539102"/>
+      </p:ext>
+    </p:extLst>
+  </p:cSld>
+  <p:clrMapOvr>
+    <a:masterClrMapping/>
+  </p:clrMapOvr>
+</p:sld>
+</file>
+
 <file path=ppt/slides/slide2.xml><?xml version="1.0" encoding="utf-8"?>
 <p:sld xmlns:a="http://schemas.openxmlformats.org/drawingml/2006/main" xmlns:r="http://schemas.openxmlformats.org/officeDocument/2006/relationships" xmlns:p="http://schemas.openxmlformats.org/presentationml/2006/main">
   <p:cSld>
@@ -4960,6 +5798,306 @@
     <p:extLst>
       <p:ext uri="{BB962C8B-B14F-4D97-AF65-F5344CB8AC3E}">
         <p14:creationId xmlns:p14="http://schemas.microsoft.com/office/powerpoint/2010/main" val="629942173"/>
+      </p:ext>
+    </p:extLst>
+  </p:cSld>
+  <p:clrMapOvr>
+    <a:masterClrMapping/>
+  </p:clrMapOvr>
+</p:sld>
+</file>
+
+<file path=ppt/slides/slide20.xml><?xml version="1.0" encoding="utf-8"?>
+<p:sld xmlns:a="http://schemas.openxmlformats.org/drawingml/2006/main" xmlns:r="http://schemas.openxmlformats.org/officeDocument/2006/relationships" xmlns:p="http://schemas.openxmlformats.org/presentationml/2006/main">
+  <p:cSld>
+    <p:spTree>
+      <p:nvGrpSpPr>
+        <p:cNvPr id="1" name=""/>
+        <p:cNvGrpSpPr/>
+        <p:nvPr/>
+      </p:nvGrpSpPr>
+      <p:grpSpPr>
+        <a:xfrm>
+          <a:off x="0" y="0"/>
+          <a:ext cx="0" cy="0"/>
+          <a:chOff x="0" y="0"/>
+          <a:chExt cx="0" cy="0"/>
+        </a:xfrm>
+      </p:grpSpPr>
+    </p:spTree>
+    <p:extLst>
+      <p:ext uri="{BB962C8B-B14F-4D97-AF65-F5344CB8AC3E}">
+        <p14:creationId xmlns:p14="http://schemas.microsoft.com/office/powerpoint/2010/main" val="1036822510"/>
+      </p:ext>
+    </p:extLst>
+  </p:cSld>
+  <p:clrMapOvr>
+    <a:masterClrMapping/>
+  </p:clrMapOvr>
+</p:sld>
+</file>
+
+<file path=ppt/slides/slide21.xml><?xml version="1.0" encoding="utf-8"?>
+<p:sld xmlns:a="http://schemas.openxmlformats.org/drawingml/2006/main" xmlns:r="http://schemas.openxmlformats.org/officeDocument/2006/relationships" xmlns:p="http://schemas.openxmlformats.org/presentationml/2006/main">
+  <p:cSld>
+    <p:spTree>
+      <p:nvGrpSpPr>
+        <p:cNvPr id="1" name=""/>
+        <p:cNvGrpSpPr/>
+        <p:nvPr/>
+      </p:nvGrpSpPr>
+      <p:grpSpPr>
+        <a:xfrm>
+          <a:off x="0" y="0"/>
+          <a:ext cx="0" cy="0"/>
+          <a:chOff x="0" y="0"/>
+          <a:chExt cx="0" cy="0"/>
+        </a:xfrm>
+      </p:grpSpPr>
+    </p:spTree>
+    <p:extLst>
+      <p:ext uri="{BB962C8B-B14F-4D97-AF65-F5344CB8AC3E}">
+        <p14:creationId xmlns:p14="http://schemas.microsoft.com/office/powerpoint/2010/main" val="2458848230"/>
+      </p:ext>
+    </p:extLst>
+  </p:cSld>
+  <p:clrMapOvr>
+    <a:masterClrMapping/>
+  </p:clrMapOvr>
+</p:sld>
+</file>
+
+<file path=ppt/slides/slide22.xml><?xml version="1.0" encoding="utf-8"?>
+<p:sld xmlns:a="http://schemas.openxmlformats.org/drawingml/2006/main" xmlns:r="http://schemas.openxmlformats.org/officeDocument/2006/relationships" xmlns:p="http://schemas.openxmlformats.org/presentationml/2006/main">
+  <p:cSld>
+    <p:spTree>
+      <p:nvGrpSpPr>
+        <p:cNvPr id="1" name=""/>
+        <p:cNvGrpSpPr/>
+        <p:nvPr/>
+      </p:nvGrpSpPr>
+      <p:grpSpPr>
+        <a:xfrm>
+          <a:off x="0" y="0"/>
+          <a:ext cx="0" cy="0"/>
+          <a:chOff x="0" y="0"/>
+          <a:chExt cx="0" cy="0"/>
+        </a:xfrm>
+      </p:grpSpPr>
+    </p:spTree>
+    <p:extLst>
+      <p:ext uri="{BB962C8B-B14F-4D97-AF65-F5344CB8AC3E}">
+        <p14:creationId xmlns:p14="http://schemas.microsoft.com/office/powerpoint/2010/main" val="1477311349"/>
+      </p:ext>
+    </p:extLst>
+  </p:cSld>
+  <p:clrMapOvr>
+    <a:masterClrMapping/>
+  </p:clrMapOvr>
+</p:sld>
+</file>
+
+<file path=ppt/slides/slide23.xml><?xml version="1.0" encoding="utf-8"?>
+<p:sld xmlns:a="http://schemas.openxmlformats.org/drawingml/2006/main" xmlns:r="http://schemas.openxmlformats.org/officeDocument/2006/relationships" xmlns:p="http://schemas.openxmlformats.org/presentationml/2006/main">
+  <p:cSld>
+    <p:spTree>
+      <p:nvGrpSpPr>
+        <p:cNvPr id="1" name=""/>
+        <p:cNvGrpSpPr/>
+        <p:nvPr/>
+      </p:nvGrpSpPr>
+      <p:grpSpPr>
+        <a:xfrm>
+          <a:off x="0" y="0"/>
+          <a:ext cx="0" cy="0"/>
+          <a:chOff x="0" y="0"/>
+          <a:chExt cx="0" cy="0"/>
+        </a:xfrm>
+      </p:grpSpPr>
+    </p:spTree>
+    <p:extLst>
+      <p:ext uri="{BB962C8B-B14F-4D97-AF65-F5344CB8AC3E}">
+        <p14:creationId xmlns:p14="http://schemas.microsoft.com/office/powerpoint/2010/main" val="1915778309"/>
+      </p:ext>
+    </p:extLst>
+  </p:cSld>
+  <p:clrMapOvr>
+    <a:masterClrMapping/>
+  </p:clrMapOvr>
+</p:sld>
+</file>
+
+<file path=ppt/slides/slide24.xml><?xml version="1.0" encoding="utf-8"?>
+<p:sld xmlns:a="http://schemas.openxmlformats.org/drawingml/2006/main" xmlns:r="http://schemas.openxmlformats.org/officeDocument/2006/relationships" xmlns:p="http://schemas.openxmlformats.org/presentationml/2006/main">
+  <p:cSld>
+    <p:spTree>
+      <p:nvGrpSpPr>
+        <p:cNvPr id="1" name=""/>
+        <p:cNvGrpSpPr/>
+        <p:nvPr/>
+      </p:nvGrpSpPr>
+      <p:grpSpPr>
+        <a:xfrm>
+          <a:off x="0" y="0"/>
+          <a:ext cx="0" cy="0"/>
+          <a:chOff x="0" y="0"/>
+          <a:chExt cx="0" cy="0"/>
+        </a:xfrm>
+      </p:grpSpPr>
+    </p:spTree>
+    <p:extLst>
+      <p:ext uri="{BB962C8B-B14F-4D97-AF65-F5344CB8AC3E}">
+        <p14:creationId xmlns:p14="http://schemas.microsoft.com/office/powerpoint/2010/main" val="2809827418"/>
+      </p:ext>
+    </p:extLst>
+  </p:cSld>
+  <p:clrMapOvr>
+    <a:masterClrMapping/>
+  </p:clrMapOvr>
+</p:sld>
+</file>
+
+<file path=ppt/slides/slide25.xml><?xml version="1.0" encoding="utf-8"?>
+<p:sld xmlns:a="http://schemas.openxmlformats.org/drawingml/2006/main" xmlns:r="http://schemas.openxmlformats.org/officeDocument/2006/relationships" xmlns:p="http://schemas.openxmlformats.org/presentationml/2006/main">
+  <p:cSld>
+    <p:spTree>
+      <p:nvGrpSpPr>
+        <p:cNvPr id="1" name=""/>
+        <p:cNvGrpSpPr/>
+        <p:nvPr/>
+      </p:nvGrpSpPr>
+      <p:grpSpPr>
+        <a:xfrm>
+          <a:off x="0" y="0"/>
+          <a:ext cx="0" cy="0"/>
+          <a:chOff x="0" y="0"/>
+          <a:chExt cx="0" cy="0"/>
+        </a:xfrm>
+      </p:grpSpPr>
+    </p:spTree>
+    <p:extLst>
+      <p:ext uri="{BB962C8B-B14F-4D97-AF65-F5344CB8AC3E}">
+        <p14:creationId xmlns:p14="http://schemas.microsoft.com/office/powerpoint/2010/main" val="1392655612"/>
+      </p:ext>
+    </p:extLst>
+  </p:cSld>
+  <p:clrMapOvr>
+    <a:masterClrMapping/>
+  </p:clrMapOvr>
+</p:sld>
+</file>
+
+<file path=ppt/slides/slide26.xml><?xml version="1.0" encoding="utf-8"?>
+<p:sld xmlns:a="http://schemas.openxmlformats.org/drawingml/2006/main" xmlns:r="http://schemas.openxmlformats.org/officeDocument/2006/relationships" xmlns:p="http://schemas.openxmlformats.org/presentationml/2006/main">
+  <p:cSld>
+    <p:spTree>
+      <p:nvGrpSpPr>
+        <p:cNvPr id="1" name=""/>
+        <p:cNvGrpSpPr/>
+        <p:nvPr/>
+      </p:nvGrpSpPr>
+      <p:grpSpPr>
+        <a:xfrm>
+          <a:off x="0" y="0"/>
+          <a:ext cx="0" cy="0"/>
+          <a:chOff x="0" y="0"/>
+          <a:chExt cx="0" cy="0"/>
+        </a:xfrm>
+      </p:grpSpPr>
+    </p:spTree>
+    <p:extLst>
+      <p:ext uri="{BB962C8B-B14F-4D97-AF65-F5344CB8AC3E}">
+        <p14:creationId xmlns:p14="http://schemas.microsoft.com/office/powerpoint/2010/main" val="2715123566"/>
+      </p:ext>
+    </p:extLst>
+  </p:cSld>
+  <p:clrMapOvr>
+    <a:masterClrMapping/>
+  </p:clrMapOvr>
+</p:sld>
+</file>
+
+<file path=ppt/slides/slide27.xml><?xml version="1.0" encoding="utf-8"?>
+<p:sld xmlns:a="http://schemas.openxmlformats.org/drawingml/2006/main" xmlns:r="http://schemas.openxmlformats.org/officeDocument/2006/relationships" xmlns:p="http://schemas.openxmlformats.org/presentationml/2006/main">
+  <p:cSld>
+    <p:spTree>
+      <p:nvGrpSpPr>
+        <p:cNvPr id="1" name=""/>
+        <p:cNvGrpSpPr/>
+        <p:nvPr/>
+      </p:nvGrpSpPr>
+      <p:grpSpPr>
+        <a:xfrm>
+          <a:off x="0" y="0"/>
+          <a:ext cx="0" cy="0"/>
+          <a:chOff x="0" y="0"/>
+          <a:chExt cx="0" cy="0"/>
+        </a:xfrm>
+      </p:grpSpPr>
+    </p:spTree>
+    <p:extLst>
+      <p:ext uri="{BB962C8B-B14F-4D97-AF65-F5344CB8AC3E}">
+        <p14:creationId xmlns:p14="http://schemas.microsoft.com/office/powerpoint/2010/main" val="2854733306"/>
+      </p:ext>
+    </p:extLst>
+  </p:cSld>
+  <p:clrMapOvr>
+    <a:masterClrMapping/>
+  </p:clrMapOvr>
+</p:sld>
+</file>
+
+<file path=ppt/slides/slide28.xml><?xml version="1.0" encoding="utf-8"?>
+<p:sld xmlns:a="http://schemas.openxmlformats.org/drawingml/2006/main" xmlns:r="http://schemas.openxmlformats.org/officeDocument/2006/relationships" xmlns:p="http://schemas.openxmlformats.org/presentationml/2006/main">
+  <p:cSld>
+    <p:spTree>
+      <p:nvGrpSpPr>
+        <p:cNvPr id="1" name=""/>
+        <p:cNvGrpSpPr/>
+        <p:nvPr/>
+      </p:nvGrpSpPr>
+      <p:grpSpPr>
+        <a:xfrm>
+          <a:off x="0" y="0"/>
+          <a:ext cx="0" cy="0"/>
+          <a:chOff x="0" y="0"/>
+          <a:chExt cx="0" cy="0"/>
+        </a:xfrm>
+      </p:grpSpPr>
+    </p:spTree>
+    <p:extLst>
+      <p:ext uri="{BB962C8B-B14F-4D97-AF65-F5344CB8AC3E}">
+        <p14:creationId xmlns:p14="http://schemas.microsoft.com/office/powerpoint/2010/main" val="2944722425"/>
+      </p:ext>
+    </p:extLst>
+  </p:cSld>
+  <p:clrMapOvr>
+    <a:masterClrMapping/>
+  </p:clrMapOvr>
+</p:sld>
+</file>
+
+<file path=ppt/slides/slide29.xml><?xml version="1.0" encoding="utf-8"?>
+<p:sld xmlns:a="http://schemas.openxmlformats.org/drawingml/2006/main" xmlns:r="http://schemas.openxmlformats.org/officeDocument/2006/relationships" xmlns:p="http://schemas.openxmlformats.org/presentationml/2006/main">
+  <p:cSld>
+    <p:spTree>
+      <p:nvGrpSpPr>
+        <p:cNvPr id="1" name=""/>
+        <p:cNvGrpSpPr/>
+        <p:nvPr/>
+      </p:nvGrpSpPr>
+      <p:grpSpPr>
+        <a:xfrm>
+          <a:off x="0" y="0"/>
+          <a:ext cx="0" cy="0"/>
+          <a:chOff x="0" y="0"/>
+          <a:chExt cx="0" cy="0"/>
+        </a:xfrm>
+      </p:grpSpPr>
+    </p:spTree>
+    <p:extLst>
+      <p:ext uri="{BB962C8B-B14F-4D97-AF65-F5344CB8AC3E}">
+        <p14:creationId xmlns:p14="http://schemas.microsoft.com/office/powerpoint/2010/main" val="3696473251"/>
       </p:ext>
     </p:extLst>
   </p:cSld>
@@ -5344,6 +6482,126 @@
     <p:extLst>
       <p:ext uri="{BB962C8B-B14F-4D97-AF65-F5344CB8AC3E}">
         <p14:creationId xmlns:p14="http://schemas.microsoft.com/office/powerpoint/2010/main" val="3858551094"/>
+      </p:ext>
+    </p:extLst>
+  </p:cSld>
+  <p:clrMapOvr>
+    <a:masterClrMapping/>
+  </p:clrMapOvr>
+</p:sld>
+</file>
+
+<file path=ppt/slides/slide30.xml><?xml version="1.0" encoding="utf-8"?>
+<p:sld xmlns:a="http://schemas.openxmlformats.org/drawingml/2006/main" xmlns:r="http://schemas.openxmlformats.org/officeDocument/2006/relationships" xmlns:p="http://schemas.openxmlformats.org/presentationml/2006/main">
+  <p:cSld>
+    <p:spTree>
+      <p:nvGrpSpPr>
+        <p:cNvPr id="1" name=""/>
+        <p:cNvGrpSpPr/>
+        <p:nvPr/>
+      </p:nvGrpSpPr>
+      <p:grpSpPr>
+        <a:xfrm>
+          <a:off x="0" y="0"/>
+          <a:ext cx="0" cy="0"/>
+          <a:chOff x="0" y="0"/>
+          <a:chExt cx="0" cy="0"/>
+        </a:xfrm>
+      </p:grpSpPr>
+    </p:spTree>
+    <p:extLst>
+      <p:ext uri="{BB962C8B-B14F-4D97-AF65-F5344CB8AC3E}">
+        <p14:creationId xmlns:p14="http://schemas.microsoft.com/office/powerpoint/2010/main" val="569498021"/>
+      </p:ext>
+    </p:extLst>
+  </p:cSld>
+  <p:clrMapOvr>
+    <a:masterClrMapping/>
+  </p:clrMapOvr>
+</p:sld>
+</file>
+
+<file path=ppt/slides/slide31.xml><?xml version="1.0" encoding="utf-8"?>
+<p:sld xmlns:a="http://schemas.openxmlformats.org/drawingml/2006/main" xmlns:r="http://schemas.openxmlformats.org/officeDocument/2006/relationships" xmlns:p="http://schemas.openxmlformats.org/presentationml/2006/main">
+  <p:cSld>
+    <p:spTree>
+      <p:nvGrpSpPr>
+        <p:cNvPr id="1" name=""/>
+        <p:cNvGrpSpPr/>
+        <p:nvPr/>
+      </p:nvGrpSpPr>
+      <p:grpSpPr>
+        <a:xfrm>
+          <a:off x="0" y="0"/>
+          <a:ext cx="0" cy="0"/>
+          <a:chOff x="0" y="0"/>
+          <a:chExt cx="0" cy="0"/>
+        </a:xfrm>
+      </p:grpSpPr>
+    </p:spTree>
+    <p:extLst>
+      <p:ext uri="{BB962C8B-B14F-4D97-AF65-F5344CB8AC3E}">
+        <p14:creationId xmlns:p14="http://schemas.microsoft.com/office/powerpoint/2010/main" val="3801801843"/>
+      </p:ext>
+    </p:extLst>
+  </p:cSld>
+  <p:clrMapOvr>
+    <a:masterClrMapping/>
+  </p:clrMapOvr>
+</p:sld>
+</file>
+
+<file path=ppt/slides/slide32.xml><?xml version="1.0" encoding="utf-8"?>
+<p:sld xmlns:a="http://schemas.openxmlformats.org/drawingml/2006/main" xmlns:r="http://schemas.openxmlformats.org/officeDocument/2006/relationships" xmlns:p="http://schemas.openxmlformats.org/presentationml/2006/main">
+  <p:cSld>
+    <p:spTree>
+      <p:nvGrpSpPr>
+        <p:cNvPr id="1" name=""/>
+        <p:cNvGrpSpPr/>
+        <p:nvPr/>
+      </p:nvGrpSpPr>
+      <p:grpSpPr>
+        <a:xfrm>
+          <a:off x="0" y="0"/>
+          <a:ext cx="0" cy="0"/>
+          <a:chOff x="0" y="0"/>
+          <a:chExt cx="0" cy="0"/>
+        </a:xfrm>
+      </p:grpSpPr>
+    </p:spTree>
+    <p:extLst>
+      <p:ext uri="{BB962C8B-B14F-4D97-AF65-F5344CB8AC3E}">
+        <p14:creationId xmlns:p14="http://schemas.microsoft.com/office/powerpoint/2010/main" val="2539330772"/>
+      </p:ext>
+    </p:extLst>
+  </p:cSld>
+  <p:clrMapOvr>
+    <a:masterClrMapping/>
+  </p:clrMapOvr>
+</p:sld>
+</file>
+
+<file path=ppt/slides/slide33.xml><?xml version="1.0" encoding="utf-8"?>
+<p:sld xmlns:a="http://schemas.openxmlformats.org/drawingml/2006/main" xmlns:r="http://schemas.openxmlformats.org/officeDocument/2006/relationships" xmlns:p="http://schemas.openxmlformats.org/presentationml/2006/main">
+  <p:cSld>
+    <p:spTree>
+      <p:nvGrpSpPr>
+        <p:cNvPr id="1" name=""/>
+        <p:cNvGrpSpPr/>
+        <p:nvPr/>
+      </p:nvGrpSpPr>
+      <p:grpSpPr>
+        <a:xfrm>
+          <a:off x="0" y="0"/>
+          <a:ext cx="0" cy="0"/>
+          <a:chOff x="0" y="0"/>
+          <a:chExt cx="0" cy="0"/>
+        </a:xfrm>
+      </p:grpSpPr>
+    </p:spTree>
+    <p:extLst>
+      <p:ext uri="{BB962C8B-B14F-4D97-AF65-F5344CB8AC3E}">
+        <p14:creationId xmlns:p14="http://schemas.microsoft.com/office/powerpoint/2010/main" val="3940954608"/>
       </p:ext>
     </p:extLst>
   </p:cSld>

</xml_diff>